<commit_message>
fixed typo in blockchain FR card
</commit_message>
<xml_diff>
--- a/docs/content/fr/cards.pptx
+++ b/docs/content/fr/cards.pptx
@@ -9098,96 +9098,114 @@
               </a:spcBef>
             </a:pPr>
             <a:r>
-              <a:rPr lang="fr-FR" sz="800" dirty="0" smtClean="0">
+              <a:rPr lang="fr-FR" sz="780" dirty="0" smtClean="0">
                 <a:latin typeface="Stone Serif" pitchFamily="2" charset="0"/>
               </a:rPr>
               <a:t>La </a:t>
             </a:r>
             <a:r>
-              <a:rPr lang="fr-FR" sz="800" dirty="0" err="1" smtClean="0">
+              <a:rPr lang="fr-FR" sz="780" dirty="0" err="1" smtClean="0">
                 <a:latin typeface="Stone Serif" pitchFamily="2" charset="0"/>
               </a:rPr>
               <a:t>blockchain</a:t>
             </a:r>
             <a:r>
-              <a:rPr lang="fr-FR" sz="800" dirty="0" smtClean="0">
+              <a:rPr lang="fr-FR" sz="780" dirty="0" smtClean="0">
                 <a:latin typeface="Stone Serif" pitchFamily="2" charset="0"/>
               </a:rPr>
               <a:t> est une technologie proche d’une base de données (</a:t>
             </a:r>
             <a:r>
-              <a:rPr lang="fr-FR" sz="800" dirty="0" err="1" smtClean="0">
+              <a:rPr lang="fr-FR" sz="780" dirty="0" err="1" smtClean="0">
                 <a:latin typeface="Stone Serif" pitchFamily="2" charset="0"/>
               </a:rPr>
               <a:t>bdd</a:t>
             </a:r>
             <a:r>
-              <a:rPr lang="fr-FR" sz="800" dirty="0" smtClean="0">
+              <a:rPr lang="fr-FR" sz="780" dirty="0" smtClean="0">
                 <a:latin typeface="Stone Serif" pitchFamily="2" charset="0"/>
               </a:rPr>
               <a:t>): elle permet l’enregistrement et l’accès à des données stockées sur un support informatique. A la différence d’une </a:t>
             </a:r>
             <a:r>
-              <a:rPr lang="fr-FR" sz="800" dirty="0" err="1" smtClean="0">
+              <a:rPr lang="fr-FR" sz="780" dirty="0" err="1" smtClean="0">
                 <a:latin typeface="Stone Serif" pitchFamily="2" charset="0"/>
               </a:rPr>
               <a:t>bdd</a:t>
             </a:r>
             <a:r>
-              <a:rPr lang="fr-FR" sz="800" dirty="0" smtClean="0">
+              <a:rPr lang="fr-FR" sz="780" dirty="0" smtClean="0">
                 <a:latin typeface="Stone Serif" pitchFamily="2" charset="0"/>
               </a:rPr>
               <a:t>, les données enregistrées sur une </a:t>
             </a:r>
             <a:r>
-              <a:rPr lang="fr-FR" sz="800" dirty="0" err="1" smtClean="0">
+              <a:rPr lang="fr-FR" sz="780" dirty="0" err="1" smtClean="0">
                 <a:latin typeface="Stone Serif" pitchFamily="2" charset="0"/>
               </a:rPr>
               <a:t>blockchain</a:t>
             </a:r>
             <a:r>
-              <a:rPr lang="fr-FR" sz="800" dirty="0" smtClean="0">
+              <a:rPr lang="fr-FR" sz="780" dirty="0" smtClean="0">
                 <a:latin typeface="Stone Serif" pitchFamily="2" charset="0"/>
               </a:rPr>
               <a:t> le sont de façon </a:t>
             </a:r>
             <a:r>
-              <a:rPr lang="fr-FR" sz="800" u="sng" dirty="0" smtClean="0">
+              <a:rPr lang="fr-FR" sz="780" u="sng" dirty="0" smtClean="0">
                 <a:latin typeface="Stone Serif" pitchFamily="2" charset="0"/>
               </a:rPr>
               <a:t>permanente</a:t>
             </a:r>
             <a:r>
-              <a:rPr lang="fr-FR" sz="800" dirty="0" smtClean="0">
+              <a:rPr lang="fr-FR" sz="780" dirty="0" smtClean="0">
                 <a:latin typeface="Stone Serif" pitchFamily="2" charset="0"/>
               </a:rPr>
               <a:t> et </a:t>
             </a:r>
             <a:r>
-              <a:rPr lang="fr-FR" sz="800" u="sng" dirty="0" smtClean="0">
+              <a:rPr lang="fr-FR" sz="780" u="sng" dirty="0" smtClean="0">
                 <a:latin typeface="Stone Serif" pitchFamily="2" charset="0"/>
               </a:rPr>
               <a:t>inaltérable</a:t>
             </a:r>
             <a:r>
-              <a:rPr lang="fr-FR" sz="800" dirty="0" smtClean="0">
-                <a:latin typeface="Stone Serif" pitchFamily="2" charset="0"/>
-              </a:rPr>
-              <a:t>: on ne pas les effacer ni les modifier. Autre différence: la </a:t>
-            </a:r>
-            <a:r>
-              <a:rPr lang="fr-FR" sz="800" dirty="0" err="1" smtClean="0">
+              <a:rPr lang="fr-FR" sz="780" dirty="0" smtClean="0">
+                <a:latin typeface="Stone Serif" pitchFamily="2" charset="0"/>
+              </a:rPr>
+              <a:t>. On </a:t>
+            </a:r>
+            <a:r>
+              <a:rPr lang="fr-FR" sz="780" dirty="0" smtClean="0">
+                <a:latin typeface="Stone Serif" pitchFamily="2" charset="0"/>
+              </a:rPr>
+              <a:t>ne </a:t>
+            </a:r>
+            <a:r>
+              <a:rPr lang="fr-FR" sz="780" dirty="0" smtClean="0">
+                <a:latin typeface="Stone Serif" pitchFamily="2" charset="0"/>
+              </a:rPr>
+              <a:t>peut ni </a:t>
+            </a:r>
+            <a:r>
+              <a:rPr lang="fr-FR" sz="780" dirty="0" smtClean="0">
+                <a:latin typeface="Stone Serif" pitchFamily="2" charset="0"/>
+              </a:rPr>
+              <a:t>les effacer ni les modifier. Autre différence: la </a:t>
+            </a:r>
+            <a:r>
+              <a:rPr lang="fr-FR" sz="780" dirty="0" err="1" smtClean="0">
                 <a:latin typeface="Stone Serif" pitchFamily="2" charset="0"/>
               </a:rPr>
               <a:t>blockchain</a:t>
             </a:r>
             <a:r>
-              <a:rPr lang="fr-FR" sz="800" dirty="0" smtClean="0">
+              <a:rPr lang="fr-FR" sz="780" dirty="0" smtClean="0">
                 <a:latin typeface="Stone Serif" pitchFamily="2" charset="0"/>
               </a:rPr>
               <a:t> n’est pas contrôlée par un acteur en particulier: chacun en possède une copie. Cela en garantit la transparence et l’inaltérabilité,  et supprime le besoin d’un tiers de confiance.</a:t>
             </a:r>
-            <a:endParaRPr lang="fr-FR" sz="800" dirty="0">
+            <a:endParaRPr lang="fr-FR" sz="780" dirty="0">
               <a:latin typeface="Stone Serif" pitchFamily="2" charset="0"/>
             </a:endParaRPr>
           </a:p>
@@ -9901,9 +9919,6 @@
               </a:rPr>
               <a:t> pour assurer le transfert d’actifs (ici, des jeux de données) entre parties prenantes, sans tiers de confiance.</a:t>
             </a:r>
-            <a:endParaRPr lang="fr-FR" sz="800" dirty="0">
-              <a:latin typeface="Stone Serif" pitchFamily="2" charset="0"/>
-            </a:endParaRPr>
           </a:p>
         </p:txBody>
       </p:sp>

</xml_diff>

<commit_message>
fixed formatting issue on card platform FR
</commit_message>
<xml_diff>
--- a/docs/content/fr/cards.pptx
+++ b/docs/content/fr/cards.pptx
@@ -10783,7 +10783,7 @@
         <p:spPr>
           <a:xfrm>
             <a:off x="450972" y="4024511"/>
-            <a:ext cx="4425828" cy="382389"/>
+            <a:ext cx="4496712" cy="382389"/>
           </a:xfrm>
           <a:prstGeom prst="rect">
             <a:avLst/>
@@ -13130,8 +13130,8 @@
         </p:nvSpPr>
         <p:spPr>
           <a:xfrm>
-            <a:off x="432366" y="3784720"/>
-            <a:ext cx="4442692" cy="279307"/>
+            <a:off x="432366" y="3795987"/>
+            <a:ext cx="4515318" cy="279307"/>
           </a:xfrm>
           <a:prstGeom prst="rect">
             <a:avLst/>

</xml_diff>

<commit_message>
updated card on platforms in EN and FR
</commit_message>
<xml_diff>
--- a/docs/content/fr/cards.pptx
+++ b/docs/content/fr/cards.pptx
@@ -211,7 +211,7 @@
           <a:p>
             <a:fld id="{D121557B-95DC-4F9D-80D7-494E711A263C}" type="datetimeFigureOut">
               <a:rPr lang="fr-FR" smtClean="0"/>
-              <a:t>13/06/2019</a:t>
+              <a:t>18/06/2019</a:t>
             </a:fld>
             <a:endParaRPr lang="fr-FR"/>
           </a:p>
@@ -377,7 +377,7 @@
           <a:p>
             <a:fld id="{34B0D5AD-2B20-4FC5-9805-AA792A2BEE79}" type="datetimeFigureOut">
               <a:rPr lang="fr-FR" smtClean="0"/>
-              <a:t>13/06/2019</a:t>
+              <a:t>18/06/2019</a:t>
             </a:fld>
             <a:endParaRPr lang="fr-FR"/>
           </a:p>
@@ -838,7 +838,7 @@
           <a:p>
             <a:fld id="{654FF092-CFE9-4329-97B3-D872B1066925}" type="datetimeFigureOut">
               <a:rPr lang="fr-FR" smtClean="0"/>
-              <a:t>13/06/2019</a:t>
+              <a:t>18/06/2019</a:t>
             </a:fld>
             <a:endParaRPr lang="fr-FR"/>
           </a:p>
@@ -1008,7 +1008,7 @@
           <a:p>
             <a:fld id="{654FF092-CFE9-4329-97B3-D872B1066925}" type="datetimeFigureOut">
               <a:rPr lang="fr-FR" smtClean="0"/>
-              <a:t>13/06/2019</a:t>
+              <a:t>18/06/2019</a:t>
             </a:fld>
             <a:endParaRPr lang="fr-FR"/>
           </a:p>
@@ -1188,7 +1188,7 @@
           <a:p>
             <a:fld id="{654FF092-CFE9-4329-97B3-D872B1066925}" type="datetimeFigureOut">
               <a:rPr lang="fr-FR" smtClean="0"/>
-              <a:t>13/06/2019</a:t>
+              <a:t>18/06/2019</a:t>
             </a:fld>
             <a:endParaRPr lang="fr-FR"/>
           </a:p>
@@ -1358,7 +1358,7 @@
           <a:p>
             <a:fld id="{654FF092-CFE9-4329-97B3-D872B1066925}" type="datetimeFigureOut">
               <a:rPr lang="fr-FR" smtClean="0"/>
-              <a:t>13/06/2019</a:t>
+              <a:t>18/06/2019</a:t>
             </a:fld>
             <a:endParaRPr lang="fr-FR"/>
           </a:p>
@@ -1602,7 +1602,7 @@
           <a:p>
             <a:fld id="{654FF092-CFE9-4329-97B3-D872B1066925}" type="datetimeFigureOut">
               <a:rPr lang="fr-FR" smtClean="0"/>
-              <a:t>13/06/2019</a:t>
+              <a:t>18/06/2019</a:t>
             </a:fld>
             <a:endParaRPr lang="fr-FR"/>
           </a:p>
@@ -1834,7 +1834,7 @@
           <a:p>
             <a:fld id="{654FF092-CFE9-4329-97B3-D872B1066925}" type="datetimeFigureOut">
               <a:rPr lang="fr-FR" smtClean="0"/>
-              <a:t>13/06/2019</a:t>
+              <a:t>18/06/2019</a:t>
             </a:fld>
             <a:endParaRPr lang="fr-FR"/>
           </a:p>
@@ -2201,7 +2201,7 @@
           <a:p>
             <a:fld id="{654FF092-CFE9-4329-97B3-D872B1066925}" type="datetimeFigureOut">
               <a:rPr lang="fr-FR" smtClean="0"/>
-              <a:t>13/06/2019</a:t>
+              <a:t>18/06/2019</a:t>
             </a:fld>
             <a:endParaRPr lang="fr-FR"/>
           </a:p>
@@ -2319,7 +2319,7 @@
           <a:p>
             <a:fld id="{654FF092-CFE9-4329-97B3-D872B1066925}" type="datetimeFigureOut">
               <a:rPr lang="fr-FR" smtClean="0"/>
-              <a:t>13/06/2019</a:t>
+              <a:t>18/06/2019</a:t>
             </a:fld>
             <a:endParaRPr lang="fr-FR"/>
           </a:p>
@@ -2414,7 +2414,7 @@
           <a:p>
             <a:fld id="{654FF092-CFE9-4329-97B3-D872B1066925}" type="datetimeFigureOut">
               <a:rPr lang="fr-FR" smtClean="0"/>
-              <a:t>13/06/2019</a:t>
+              <a:t>18/06/2019</a:t>
             </a:fld>
             <a:endParaRPr lang="fr-FR"/>
           </a:p>
@@ -2691,7 +2691,7 @@
           <a:p>
             <a:fld id="{654FF092-CFE9-4329-97B3-D872B1066925}" type="datetimeFigureOut">
               <a:rPr lang="fr-FR" smtClean="0"/>
-              <a:t>13/06/2019</a:t>
+              <a:t>18/06/2019</a:t>
             </a:fld>
             <a:endParaRPr lang="fr-FR"/>
           </a:p>
@@ -2948,7 +2948,7 @@
           <a:p>
             <a:fld id="{654FF092-CFE9-4329-97B3-D872B1066925}" type="datetimeFigureOut">
               <a:rPr lang="fr-FR" smtClean="0"/>
-              <a:t>13/06/2019</a:t>
+              <a:t>18/06/2019</a:t>
             </a:fld>
             <a:endParaRPr lang="fr-FR"/>
           </a:p>
@@ -3161,7 +3161,7 @@
           <a:p>
             <a:fld id="{654FF092-CFE9-4329-97B3-D872B1066925}" type="datetimeFigureOut">
               <a:rPr lang="fr-FR" smtClean="0"/>
-              <a:t>13/06/2019</a:t>
+              <a:t>18/06/2019</a:t>
             </a:fld>
             <a:endParaRPr lang="fr-FR"/>
           </a:p>
@@ -8678,13 +8678,7 @@
               <a:rPr lang="fr-FR" sz="700" dirty="0" smtClean="0">
                 <a:latin typeface="Stone Serif" pitchFamily="2" charset="0"/>
               </a:rPr>
-              <a:t> </a:t>
-            </a:r>
-            <a:r>
-              <a:rPr lang="fr-FR" sz="700" dirty="0" smtClean="0">
-                <a:latin typeface="Stone Serif" pitchFamily="2" charset="0"/>
-              </a:rPr>
-              <a:t>"</a:t>
+              <a:t> "</a:t>
             </a:r>
             <a:r>
               <a:rPr lang="fr-FR" sz="700" dirty="0">
@@ -8692,9 +8686,6 @@
               </a:rPr>
               <a:t>rapproche les patients, les fournisseurs, les payeurs, les régulateurs et le secteur pharmaceutique en transportant des données de manière transparente entre plusieurs parties prenantes du secteur de la santé, en offrant une utilisation sécurisée d'une version unique et véridique des données de santé."</a:t>
             </a:r>
-            <a:endParaRPr lang="fr-FR" sz="700" dirty="0">
-              <a:latin typeface="Stone Serif" pitchFamily="2" charset="0"/>
-            </a:endParaRPr>
           </a:p>
         </p:txBody>
       </p:sp>
@@ -10121,13 +10112,7 @@
               <a:rPr lang="fr-FR" sz="700" dirty="0" smtClean="0">
                 <a:latin typeface="Stone Serif" pitchFamily="2" charset="0"/>
               </a:rPr>
-              <a:t>- </a:t>
-            </a:r>
-            <a:r>
-              <a:rPr lang="fr-FR" sz="700" dirty="0" smtClean="0">
-                <a:latin typeface="Stone Serif" pitchFamily="2" charset="0"/>
-              </a:rPr>
-              <a:t>start-up développant une solution d’authentification de diplômes, multi-écoles.</a:t>
+              <a:t>- start-up développant une solution d’authentification de diplômes, multi-écoles.</a:t>
             </a:r>
             <a:endParaRPr lang="fr-FR" sz="700" dirty="0">
               <a:latin typeface="Stone Serif" pitchFamily="2" charset="0"/>
@@ -10797,8 +10782,8 @@
         </p:nvSpPr>
         <p:spPr>
           <a:xfrm>
-            <a:off x="450972" y="4024511"/>
-            <a:ext cx="4496712" cy="382389"/>
+            <a:off x="432366" y="3517018"/>
+            <a:ext cx="3085534" cy="822247"/>
           </a:xfrm>
           <a:prstGeom prst="rect">
             <a:avLst/>
@@ -10985,65 +10970,123 @@
               </a:lnSpc>
             </a:pPr>
             <a:r>
-              <a:rPr lang="fr-FR" sz="800" dirty="0" smtClean="0">
+              <a:rPr lang="fr-FR" sz="700" dirty="0" smtClean="0">
                 <a:latin typeface="Stone Serif" pitchFamily="2" charset="0"/>
               </a:rPr>
               <a:t>A. </a:t>
             </a:r>
             <a:r>
-              <a:rPr lang="fr-FR" sz="800" dirty="0" err="1" smtClean="0">
+              <a:rPr lang="fr-FR" sz="700" dirty="0" err="1" smtClean="0">
                 <a:latin typeface="Stone Serif" pitchFamily="2" charset="0"/>
               </a:rPr>
               <a:t>Casilli</a:t>
             </a:r>
             <a:r>
-              <a:rPr lang="fr-FR" sz="800" dirty="0" smtClean="0">
+              <a:rPr lang="fr-FR" sz="700" dirty="0" smtClean="0">
                 <a:latin typeface="Stone Serif" pitchFamily="2" charset="0"/>
               </a:rPr>
               <a:t>, </a:t>
             </a:r>
             <a:r>
-              <a:rPr lang="fr-FR" sz="800" i="1" dirty="0" smtClean="0">
+              <a:rPr lang="fr-FR" sz="700" i="1" dirty="0" smtClean="0">
                 <a:latin typeface="Stone Serif" pitchFamily="2" charset="0"/>
               </a:rPr>
               <a:t>En attendant les robots</a:t>
             </a:r>
             <a:r>
-              <a:rPr lang="fr-FR" sz="800" dirty="0" smtClean="0">
+              <a:rPr lang="fr-FR" sz="700" dirty="0" smtClean="0">
                 <a:latin typeface="Stone Serif" pitchFamily="2" charset="0"/>
               </a:rPr>
               <a:t>,  Seuil, 2019.</a:t>
             </a:r>
             <a:br>
-              <a:rPr lang="fr-FR" sz="800" dirty="0" smtClean="0">
+              <a:rPr lang="fr-FR" sz="700" dirty="0" smtClean="0">
                 <a:latin typeface="Stone Serif" pitchFamily="2" charset="0"/>
               </a:rPr>
             </a:br>
             <a:r>
-              <a:rPr lang="da-DK" sz="800" dirty="0" smtClean="0">
+              <a:rPr lang="da-DK" sz="700" dirty="0" smtClean="0">
                 <a:latin typeface="Stone Serif" pitchFamily="2" charset="0"/>
               </a:rPr>
               <a:t>A. Mcafee &amp; E. Brynjolfsson, </a:t>
             </a:r>
             <a:r>
-              <a:rPr lang="fr-FR" sz="800" i="1" dirty="0">
+              <a:rPr lang="fr-FR" sz="700" i="1" dirty="0">
                 <a:latin typeface="Stone Serif" pitchFamily="2" charset="0"/>
               </a:rPr>
               <a:t>Des Machines, des plateformes et des </a:t>
             </a:r>
             <a:r>
-              <a:rPr lang="fr-FR" sz="800" i="1" dirty="0" smtClean="0">
+              <a:rPr lang="fr-FR" sz="700" i="1" dirty="0" smtClean="0">
                 <a:latin typeface="Stone Serif" pitchFamily="2" charset="0"/>
               </a:rPr>
               <a:t>foules</a:t>
             </a:r>
             <a:r>
-              <a:rPr lang="fr-FR" sz="800" dirty="0" smtClean="0">
-                <a:latin typeface="Stone Serif" pitchFamily="2" charset="0"/>
-              </a:rPr>
-              <a:t>, Odile Jacob, 2018.</a:t>
-            </a:r>
-            <a:endParaRPr lang="fr-FR" sz="800" i="1" dirty="0">
+              <a:rPr lang="fr-FR" sz="700" dirty="0" smtClean="0">
+                <a:latin typeface="Stone Serif" pitchFamily="2" charset="0"/>
+              </a:rPr>
+              <a:t>, Odile Jacob, 2018</a:t>
+            </a:r>
+            <a:r>
+              <a:rPr lang="fr-FR" sz="700" dirty="0" smtClean="0">
+                <a:latin typeface="Stone Serif" pitchFamily="2" charset="0"/>
+              </a:rPr>
+              <a:t>.</a:t>
+            </a:r>
+          </a:p>
+          <a:p>
+            <a:pPr algn="l">
+              <a:lnSpc>
+                <a:spcPct val="135000"/>
+              </a:lnSpc>
+            </a:pPr>
+            <a:r>
+              <a:rPr lang="fr-FR" sz="700" dirty="0">
+                <a:latin typeface="Stone Serif" pitchFamily="2" charset="0"/>
+              </a:rPr>
+              <a:t>Platform Design </a:t>
+            </a:r>
+            <a:r>
+              <a:rPr lang="fr-FR" sz="700" dirty="0" err="1" smtClean="0">
+                <a:latin typeface="Stone Serif" pitchFamily="2" charset="0"/>
+              </a:rPr>
+              <a:t>Toolkit</a:t>
+            </a:r>
+            <a:r>
+              <a:rPr lang="fr-FR" sz="700" dirty="0" smtClean="0">
+                <a:latin typeface="Stone Serif" pitchFamily="2" charset="0"/>
+              </a:rPr>
+              <a:t>: </a:t>
+            </a:r>
+            <a:r>
+              <a:rPr lang="fr-FR" sz="700" dirty="0" smtClean="0">
+                <a:latin typeface="Stone Serif" pitchFamily="2" charset="0"/>
+                <a:hlinkClick r:id="rId2"/>
+              </a:rPr>
+              <a:t>https</a:t>
+            </a:r>
+            <a:r>
+              <a:rPr lang="fr-FR" sz="700" dirty="0">
+                <a:latin typeface="Stone Serif" pitchFamily="2" charset="0"/>
+                <a:hlinkClick r:id="rId2"/>
+              </a:rPr>
+              <a:t>://platformdesigntoolkit.com/</a:t>
+            </a:r>
+            <a:r>
+              <a:rPr lang="fr-FR" sz="700" dirty="0">
+                <a:latin typeface="Stone Serif" pitchFamily="2" charset="0"/>
+              </a:rPr>
+              <a:t> </a:t>
+            </a:r>
+          </a:p>
+          <a:p>
+            <a:pPr algn="l">
+              <a:lnSpc>
+                <a:spcPct val="135000"/>
+              </a:lnSpc>
+            </a:pPr>
+            <a:endParaRPr lang="fr-FR" sz="700" i="1" dirty="0">
               <a:latin typeface="Stone Serif" pitchFamily="2" charset="0"/>
             </a:endParaRPr>
           </a:p>
@@ -11635,8 +11678,8 @@
         </p:nvSpPr>
         <p:spPr>
           <a:xfrm>
-            <a:off x="4090260" y="1461519"/>
-            <a:ext cx="3224941" cy="2278631"/>
+            <a:off x="3600450" y="1216371"/>
+            <a:ext cx="3714749" cy="1857029"/>
           </a:xfrm>
           <a:ln>
             <a:solidFill>
@@ -11647,7 +11690,7 @@
         </p:spPr>
         <p:txBody>
           <a:bodyPr>
-            <a:normAutofit fontScale="85000" lnSpcReduction="20000"/>
+            <a:normAutofit/>
           </a:bodyPr>
           <a:lstStyle/>
           <a:p>
@@ -11660,61 +11703,61 @@
               </a:spcBef>
             </a:pPr>
             <a:r>
-              <a:rPr lang="fr-FR" sz="800" dirty="0" smtClean="0">
+              <a:rPr lang="fr-FR" sz="600" dirty="0" smtClean="0">
                 <a:latin typeface="Stone Serif" pitchFamily="2" charset="0"/>
               </a:rPr>
               <a:t>L’avantage </a:t>
             </a:r>
             <a:r>
-              <a:rPr lang="fr-FR" sz="800" dirty="0">
+              <a:rPr lang="fr-FR" sz="600" dirty="0">
                 <a:latin typeface="Stone Serif" pitchFamily="2" charset="0"/>
               </a:rPr>
               <a:t>concurrentiel </a:t>
             </a:r>
             <a:r>
-              <a:rPr lang="fr-FR" sz="800" dirty="0" smtClean="0">
+              <a:rPr lang="fr-FR" sz="600" dirty="0" smtClean="0">
                 <a:latin typeface="Stone Serif" pitchFamily="2" charset="0"/>
               </a:rPr>
               <a:t>d’une plateforme n’est pas le </a:t>
             </a:r>
             <a:r>
-              <a:rPr lang="fr-FR" sz="800" dirty="0" err="1">
+              <a:rPr lang="fr-FR" sz="600" dirty="0" err="1">
                 <a:latin typeface="Stone Serif" pitchFamily="2" charset="0"/>
               </a:rPr>
               <a:t>market</a:t>
             </a:r>
             <a:r>
-              <a:rPr lang="fr-FR" sz="800" dirty="0">
+              <a:rPr lang="fr-FR" sz="600" dirty="0">
                 <a:latin typeface="Stone Serif" pitchFamily="2" charset="0"/>
               </a:rPr>
               <a:t> fit entre </a:t>
             </a:r>
             <a:r>
-              <a:rPr lang="fr-FR" sz="800" dirty="0" smtClean="0">
+              <a:rPr lang="fr-FR" sz="600" dirty="0" smtClean="0">
                 <a:latin typeface="Stone Serif" pitchFamily="2" charset="0"/>
               </a:rPr>
               <a:t>un </a:t>
             </a:r>
             <a:r>
-              <a:rPr lang="fr-FR" sz="800" dirty="0">
+              <a:rPr lang="fr-FR" sz="600" dirty="0">
                 <a:latin typeface="Stone Serif" pitchFamily="2" charset="0"/>
               </a:rPr>
               <a:t>produit créé </a:t>
             </a:r>
             <a:r>
-              <a:rPr lang="fr-FR" sz="800" dirty="0" smtClean="0">
+              <a:rPr lang="fr-FR" sz="600" dirty="0" smtClean="0">
                 <a:latin typeface="Stone Serif" pitchFamily="2" charset="0"/>
               </a:rPr>
               <a:t>en interne et des acheteurs externes, </a:t>
             </a:r>
             <a:r>
-              <a:rPr lang="fr-FR" sz="800" dirty="0">
+              <a:rPr lang="fr-FR" sz="600" dirty="0">
                 <a:latin typeface="Stone Serif" pitchFamily="2" charset="0"/>
               </a:rPr>
               <a:t>mais sa capacité </a:t>
             </a:r>
             <a:r>
-              <a:rPr lang="fr-FR" sz="800" dirty="0" smtClean="0">
+              <a:rPr lang="fr-FR" sz="600" dirty="0" smtClean="0">
                 <a:latin typeface="Stone Serif" pitchFamily="2" charset="0"/>
               </a:rPr>
               <a:t>à :</a:t>
@@ -11729,7 +11772,7 @@
                 <a:spcPts val="0"/>
               </a:spcBef>
             </a:pPr>
-            <a:endParaRPr lang="fr-FR" sz="800" dirty="0" smtClean="0">
+            <a:endParaRPr lang="fr-FR" sz="600" dirty="0" smtClean="0">
               <a:latin typeface="Stone Serif" pitchFamily="2" charset="0"/>
             </a:endParaRPr>
           </a:p>
@@ -11745,43 +11788,43 @@
               <a:buChar char="-"/>
             </a:pPr>
             <a:r>
-              <a:rPr lang="fr-FR" sz="800" b="1" dirty="0" smtClean="0">
+              <a:rPr lang="fr-FR" sz="600" b="1" dirty="0" smtClean="0">
                 <a:latin typeface="Stone Serif" pitchFamily="2" charset="0"/>
               </a:rPr>
               <a:t>orchestrer </a:t>
             </a:r>
             <a:r>
-              <a:rPr lang="fr-FR" sz="800" b="1" dirty="0">
+              <a:rPr lang="fr-FR" sz="600" b="1" dirty="0">
                 <a:latin typeface="Stone Serif" pitchFamily="2" charset="0"/>
               </a:rPr>
               <a:t>une coordination</a:t>
             </a:r>
             <a:r>
-              <a:rPr lang="fr-FR" sz="800" dirty="0">
+              <a:rPr lang="fr-FR" sz="600" dirty="0">
                 <a:latin typeface="Stone Serif" pitchFamily="2" charset="0"/>
               </a:rPr>
               <a:t> </a:t>
             </a:r>
             <a:r>
-              <a:rPr lang="fr-FR" sz="800" dirty="0" smtClean="0">
+              <a:rPr lang="fr-FR" sz="600" dirty="0" smtClean="0">
                 <a:latin typeface="Stone Serif" pitchFamily="2" charset="0"/>
               </a:rPr>
               <a:t>utile, fluide et efficace </a:t>
             </a:r>
             <a:r>
-              <a:rPr lang="fr-FR" sz="800" dirty="0">
+              <a:rPr lang="fr-FR" sz="600" dirty="0">
                 <a:latin typeface="Stone Serif" pitchFamily="2" charset="0"/>
               </a:rPr>
               <a:t>entre </a:t>
             </a:r>
             <a:r>
-              <a:rPr lang="fr-FR" sz="800" dirty="0" smtClean="0">
+              <a:rPr lang="fr-FR" sz="600" dirty="0" smtClean="0">
                 <a:latin typeface="Stone Serif" pitchFamily="2" charset="0"/>
               </a:rPr>
               <a:t>tierces parties nombreuses et variées.  Cela suppose une collecte intensive de données sur les acteurs de la plateforme et leurs usages (voir fiches </a:t>
             </a:r>
             <a:r>
-              <a:rPr lang="fr-FR" sz="800" b="1" i="1" dirty="0" err="1" smtClean="0">
+              <a:rPr lang="fr-FR" sz="600" b="1" i="1" dirty="0" err="1" smtClean="0">
                 <a:solidFill>
                   <a:srgbClr val="E80C72"/>
                 </a:solidFill>
@@ -11790,7 +11833,7 @@
               <a:t>big</a:t>
             </a:r>
             <a:r>
-              <a:rPr lang="fr-FR" sz="800" b="1" i="1" dirty="0" smtClean="0">
+              <a:rPr lang="fr-FR" sz="600" b="1" i="1" dirty="0" smtClean="0">
                 <a:solidFill>
                   <a:srgbClr val="E80C72"/>
                 </a:solidFill>
@@ -11799,13 +11842,13 @@
               <a:t> data</a:t>
             </a:r>
             <a:r>
-              <a:rPr lang="fr-FR" sz="800" dirty="0" smtClean="0">
+              <a:rPr lang="fr-FR" sz="600" dirty="0" smtClean="0">
                 <a:latin typeface="Stone Serif" pitchFamily="2" charset="0"/>
               </a:rPr>
               <a:t> et </a:t>
             </a:r>
             <a:r>
-              <a:rPr lang="fr-FR" sz="800" b="1" i="1" dirty="0" err="1">
+              <a:rPr lang="fr-FR" sz="600" b="1" i="1" dirty="0" err="1">
                 <a:solidFill>
                   <a:srgbClr val="E80C72"/>
                 </a:solidFill>
@@ -11814,25 +11857,25 @@
               <a:t>IoT</a:t>
             </a:r>
             <a:r>
-              <a:rPr lang="fr-FR" sz="800" dirty="0" smtClean="0">
+              <a:rPr lang="fr-FR" sz="600" dirty="0" smtClean="0">
                 <a:latin typeface="Stone Serif" pitchFamily="2" charset="0"/>
               </a:rPr>
               <a:t>),  une automation et </a:t>
             </a:r>
             <a:r>
-              <a:rPr lang="fr-FR" sz="800" dirty="0" err="1" smtClean="0">
+              <a:rPr lang="fr-FR" sz="600" dirty="0" err="1" smtClean="0">
                 <a:latin typeface="Stone Serif" pitchFamily="2" charset="0"/>
               </a:rPr>
               <a:t>scalabilité</a:t>
             </a:r>
             <a:r>
-              <a:rPr lang="fr-FR" sz="800" dirty="0" smtClean="0">
+              <a:rPr lang="fr-FR" sz="600" dirty="0" smtClean="0">
                 <a:latin typeface="Stone Serif" pitchFamily="2" charset="0"/>
               </a:rPr>
               <a:t> des échanges d’information (voir fiches </a:t>
             </a:r>
             <a:r>
-              <a:rPr lang="fr-FR" sz="800" b="1" i="1" dirty="0" smtClean="0">
+              <a:rPr lang="fr-FR" sz="600" b="1" i="1" dirty="0" smtClean="0">
                 <a:solidFill>
                   <a:srgbClr val="E80C72"/>
                 </a:solidFill>
@@ -11841,13 +11884,13 @@
               <a:t>web API</a:t>
             </a:r>
             <a:r>
-              <a:rPr lang="fr-FR" sz="800" dirty="0" smtClean="0">
+              <a:rPr lang="fr-FR" sz="600" dirty="0" smtClean="0">
                 <a:latin typeface="Stone Serif" pitchFamily="2" charset="0"/>
               </a:rPr>
               <a:t> et </a:t>
             </a:r>
             <a:r>
-              <a:rPr lang="fr-FR" sz="800" b="1" i="1" dirty="0">
+              <a:rPr lang="fr-FR" sz="600" b="1" i="1" dirty="0">
                 <a:solidFill>
                   <a:srgbClr val="E80C72"/>
                 </a:solidFill>
@@ -11856,13 +11899,13 @@
               <a:t>cloud</a:t>
             </a:r>
             <a:r>
-              <a:rPr lang="fr-FR" sz="800" dirty="0" smtClean="0">
+              <a:rPr lang="fr-FR" sz="600" dirty="0" smtClean="0">
                 <a:latin typeface="Stone Serif" pitchFamily="2" charset="0"/>
               </a:rPr>
               <a:t>), l’excellence des moyens permettant de s’interfacer (voir fiches </a:t>
             </a:r>
             <a:r>
-              <a:rPr lang="fr-FR" sz="800" b="1" i="1" dirty="0" smtClean="0">
+              <a:rPr lang="fr-FR" sz="600" b="1" i="1" dirty="0" smtClean="0">
                 <a:solidFill>
                   <a:srgbClr val="E80C72"/>
                 </a:solidFill>
@@ -11871,13 +11914,13 @@
               <a:t>web API</a:t>
             </a:r>
             <a:r>
-              <a:rPr lang="fr-FR" sz="800" dirty="0" smtClean="0">
+              <a:rPr lang="fr-FR" sz="600" dirty="0" smtClean="0">
                 <a:latin typeface="Stone Serif" pitchFamily="2" charset="0"/>
               </a:rPr>
               <a:t> et </a:t>
             </a:r>
             <a:r>
-              <a:rPr lang="fr-FR" sz="800" b="1" i="1" dirty="0" smtClean="0">
+              <a:rPr lang="fr-FR" sz="600" b="1" i="1" dirty="0" smtClean="0">
                 <a:solidFill>
                   <a:srgbClr val="E80C72"/>
                 </a:solidFill>
@@ -11886,13 +11929,13 @@
               <a:t>visualisation des données</a:t>
             </a:r>
             <a:r>
-              <a:rPr lang="fr-FR" sz="800" dirty="0" smtClean="0">
+              <a:rPr lang="fr-FR" sz="600" dirty="0" smtClean="0">
                 <a:latin typeface="Stone Serif" pitchFamily="2" charset="0"/>
               </a:rPr>
               <a:t>), et la gestion fine des droits et devoirs associés aux données (voir fiches </a:t>
             </a:r>
             <a:r>
-              <a:rPr lang="fr-FR" sz="800" b="1" i="1" dirty="0">
+              <a:rPr lang="fr-FR" sz="600" b="1" i="1" dirty="0">
                 <a:solidFill>
                   <a:srgbClr val="E80C72"/>
                 </a:solidFill>
@@ -11901,13 +11944,13 @@
               <a:t>RGPD</a:t>
             </a:r>
             <a:r>
-              <a:rPr lang="fr-FR" sz="800" dirty="0" smtClean="0">
+              <a:rPr lang="fr-FR" sz="600" dirty="0" smtClean="0">
                 <a:latin typeface="Stone Serif" pitchFamily="2" charset="0"/>
               </a:rPr>
               <a:t> et </a:t>
             </a:r>
             <a:r>
-              <a:rPr lang="fr-FR" sz="800" b="1" i="1" dirty="0" err="1">
+              <a:rPr lang="fr-FR" sz="600" b="1" i="1" dirty="0" err="1">
                 <a:solidFill>
                   <a:srgbClr val="E80C72"/>
                 </a:solidFill>
@@ -11916,7 +11959,7 @@
               <a:t>blockchain</a:t>
             </a:r>
             <a:r>
-              <a:rPr lang="fr-FR" sz="800" dirty="0" smtClean="0">
+              <a:rPr lang="fr-FR" sz="600" dirty="0" smtClean="0">
                 <a:latin typeface="Stone Serif" pitchFamily="2" charset="0"/>
               </a:rPr>
               <a:t>).</a:t>
@@ -11933,7 +11976,7 @@
               <a:buFontTx/>
               <a:buChar char="-"/>
             </a:pPr>
-            <a:endParaRPr lang="fr-FR" sz="800" dirty="0" smtClean="0">
+            <a:endParaRPr lang="fr-FR" sz="600" dirty="0" smtClean="0">
               <a:latin typeface="Stone Serif" pitchFamily="2" charset="0"/>
             </a:endParaRPr>
           </a:p>
@@ -11949,19 +11992,19 @@
               <a:buChar char="-"/>
             </a:pPr>
             <a:r>
-              <a:rPr lang="fr-FR" sz="800" b="1" dirty="0" smtClean="0">
+              <a:rPr lang="fr-FR" sz="600" b="1" dirty="0" smtClean="0">
                 <a:latin typeface="Stone Serif" pitchFamily="2" charset="0"/>
               </a:rPr>
               <a:t>mettre en place des mécanismes d’apprentissage </a:t>
             </a:r>
             <a:r>
-              <a:rPr lang="fr-FR" sz="800" dirty="0" smtClean="0">
+              <a:rPr lang="fr-FR" sz="600" dirty="0" smtClean="0">
                 <a:latin typeface="Stone Serif" pitchFamily="2" charset="0"/>
               </a:rPr>
               <a:t>qui accroissent la valeur tirée par les utilisateurs de la plateforme au cours du temps. Cela est rendu possible par l’analyse de données (voir fiches </a:t>
             </a:r>
             <a:r>
-              <a:rPr lang="fr-FR" sz="800" b="1" i="1" dirty="0">
+              <a:rPr lang="fr-FR" sz="600" b="1" i="1" dirty="0">
                 <a:solidFill>
                   <a:srgbClr val="E80C72"/>
                 </a:solidFill>
@@ -11970,13 +12013,13 @@
               <a:t>IA</a:t>
             </a:r>
             <a:r>
-              <a:rPr lang="fr-FR" sz="800" dirty="0" smtClean="0">
+              <a:rPr lang="fr-FR" sz="600" dirty="0" smtClean="0">
                 <a:latin typeface="Stone Serif" pitchFamily="2" charset="0"/>
               </a:rPr>
               <a:t>, </a:t>
             </a:r>
             <a:r>
-              <a:rPr lang="fr-FR" sz="800" b="1" i="1" dirty="0">
+              <a:rPr lang="fr-FR" sz="600" b="1" i="1" dirty="0">
                 <a:solidFill>
                   <a:srgbClr val="E80C72"/>
                 </a:solidFill>
@@ -11985,7 +12028,7 @@
               <a:t>machine </a:t>
             </a:r>
             <a:r>
-              <a:rPr lang="fr-FR" sz="800" b="1" i="1" dirty="0" err="1">
+              <a:rPr lang="fr-FR" sz="600" b="1" i="1" dirty="0" err="1">
                 <a:solidFill>
                   <a:srgbClr val="E80C72"/>
                 </a:solidFill>
@@ -11994,13 +12037,13 @@
               <a:t>learning</a:t>
             </a:r>
             <a:r>
-              <a:rPr lang="fr-FR" sz="800" dirty="0" smtClean="0">
+              <a:rPr lang="fr-FR" sz="600" dirty="0" smtClean="0">
                 <a:latin typeface="Stone Serif" pitchFamily="2" charset="0"/>
               </a:rPr>
               <a:t>, </a:t>
             </a:r>
             <a:r>
-              <a:rPr lang="fr-FR" sz="800" b="1" i="1" dirty="0">
+              <a:rPr lang="fr-FR" sz="600" b="1" i="1" dirty="0">
                 <a:solidFill>
                   <a:srgbClr val="E80C72"/>
                 </a:solidFill>
@@ -12009,7 +12052,7 @@
               <a:t>graph </a:t>
             </a:r>
             <a:r>
-              <a:rPr lang="fr-FR" sz="800" b="1" i="1" dirty="0" err="1">
+              <a:rPr lang="fr-FR" sz="600" b="1" i="1" dirty="0" err="1">
                 <a:solidFill>
                   <a:srgbClr val="E80C72"/>
                 </a:solidFill>
@@ -12018,13 +12061,13 @@
               <a:t>mining</a:t>
             </a:r>
             <a:r>
-              <a:rPr lang="fr-FR" sz="800" dirty="0" smtClean="0">
+              <a:rPr lang="fr-FR" sz="600" dirty="0" smtClean="0">
                 <a:latin typeface="Stone Serif" pitchFamily="2" charset="0"/>
               </a:rPr>
               <a:t>, </a:t>
             </a:r>
             <a:r>
-              <a:rPr lang="fr-FR" sz="800" b="1" i="1" dirty="0" err="1">
+              <a:rPr lang="fr-FR" sz="600" b="1" i="1" dirty="0" err="1">
                 <a:solidFill>
                   <a:srgbClr val="E80C72"/>
                 </a:solidFill>
@@ -12033,7 +12076,7 @@
               <a:t>text</a:t>
             </a:r>
             <a:r>
-              <a:rPr lang="fr-FR" sz="800" b="1" i="1" dirty="0">
+              <a:rPr lang="fr-FR" sz="600" b="1" i="1" dirty="0">
                 <a:solidFill>
                   <a:srgbClr val="E80C72"/>
                 </a:solidFill>
@@ -12042,7 +12085,7 @@
               <a:t> </a:t>
             </a:r>
             <a:r>
-              <a:rPr lang="fr-FR" sz="800" b="1" i="1" dirty="0" err="1">
+              <a:rPr lang="fr-FR" sz="600" b="1" i="1" dirty="0" err="1">
                 <a:solidFill>
                   <a:srgbClr val="E80C72"/>
                 </a:solidFill>
@@ -12051,7 +12094,7 @@
               <a:t>mining</a:t>
             </a:r>
             <a:r>
-              <a:rPr lang="fr-FR" sz="800" dirty="0" smtClean="0">
+              <a:rPr lang="fr-FR" sz="600" dirty="0" smtClean="0">
                 <a:latin typeface="Stone Serif" pitchFamily="2" charset="0"/>
               </a:rPr>
               <a:t>).</a:t>
@@ -12068,7 +12111,7 @@
               <a:buFontTx/>
               <a:buChar char="-"/>
             </a:pPr>
-            <a:endParaRPr lang="fr-FR" sz="800" dirty="0" smtClean="0">
+            <a:endParaRPr lang="fr-FR" sz="600" dirty="0" smtClean="0">
               <a:latin typeface="Stone Serif" pitchFamily="2" charset="0"/>
             </a:endParaRPr>
           </a:p>
@@ -12083,7 +12126,7 @@
               <a:buFontTx/>
               <a:buChar char="-"/>
             </a:pPr>
-            <a:endParaRPr lang="fr-FR" sz="800" dirty="0" smtClean="0">
+            <a:endParaRPr lang="fr-FR" sz="600" dirty="0" smtClean="0">
               <a:latin typeface="Stone Serif" pitchFamily="2" charset="0"/>
             </a:endParaRPr>
           </a:p>
@@ -12156,7 +12199,7 @@
         <p:spPr>
           <a:xfrm>
             <a:off x="432657" y="1248866"/>
-            <a:ext cx="3409241" cy="2491284"/>
+            <a:ext cx="3085243" cy="2011214"/>
           </a:xfrm>
           <a:prstGeom prst="rect">
             <a:avLst/>
@@ -12346,46 +12389,66 @@
               </a:spcBef>
             </a:pPr>
             <a:r>
-              <a:rPr lang="fr-FR" sz="700" dirty="0" smtClean="0">
+              <a:rPr lang="fr-FR" sz="600" dirty="0" smtClean="0">
                 <a:latin typeface="Stone Serif" pitchFamily="2" charset="0"/>
               </a:rPr>
               <a:t>Une plateforme est une structure </a:t>
             </a:r>
             <a:r>
-              <a:rPr lang="fr-FR" sz="700" dirty="0" err="1" smtClean="0">
+              <a:rPr lang="fr-FR" sz="600" dirty="0" err="1" smtClean="0">
                 <a:latin typeface="Stone Serif" pitchFamily="2" charset="0"/>
               </a:rPr>
               <a:t>mi-organisation</a:t>
             </a:r>
             <a:r>
-              <a:rPr lang="fr-FR" sz="700" dirty="0" smtClean="0">
+              <a:rPr lang="fr-FR" sz="600" dirty="0" smtClean="0">
                 <a:latin typeface="Stone Serif" pitchFamily="2" charset="0"/>
               </a:rPr>
               <a:t>, </a:t>
             </a:r>
             <a:r>
-              <a:rPr lang="fr-FR" sz="700" dirty="0" err="1" smtClean="0">
+              <a:rPr lang="fr-FR" sz="600" dirty="0" err="1" smtClean="0">
                 <a:latin typeface="Stone Serif" pitchFamily="2" charset="0"/>
               </a:rPr>
               <a:t>mi-marché</a:t>
             </a:r>
             <a:r>
-              <a:rPr lang="fr-FR" sz="700" dirty="0" smtClean="0">
-                <a:latin typeface="Stone Serif" pitchFamily="2" charset="0"/>
-              </a:rPr>
-              <a:t>, qui coordonne et stimule les transactions entre producteurs et consommateurs de biens et services. La plateforme est mise en place par une ou des organisations qui tirent parti de la valeur créée.</a:t>
-            </a:r>
-          </a:p>
-          <a:p>
-            <a:pPr algn="just">
-              <a:lnSpc>
-                <a:spcPct val="135000"/>
-              </a:lnSpc>
-              <a:spcBef>
-                <a:spcPts val="0"/>
-              </a:spcBef>
-            </a:pPr>
-            <a:endParaRPr lang="fr-FR" sz="700" dirty="0" smtClean="0">
+              <a:rPr lang="fr-FR" sz="600" dirty="0" smtClean="0">
+                <a:latin typeface="Stone Serif" pitchFamily="2" charset="0"/>
+              </a:rPr>
+              <a:t>, qui coordonne et stimule les transactions </a:t>
+            </a:r>
+            <a:r>
+              <a:rPr lang="fr-FR" sz="600" dirty="0" smtClean="0">
+                <a:latin typeface="Stone Serif" pitchFamily="2" charset="0"/>
+              </a:rPr>
+              <a:t>entre producteurs </a:t>
+            </a:r>
+            <a:r>
+              <a:rPr lang="fr-FR" sz="600" dirty="0" smtClean="0">
+                <a:latin typeface="Stone Serif" pitchFamily="2" charset="0"/>
+              </a:rPr>
+              <a:t>et consommateurs de biens et </a:t>
+            </a:r>
+            <a:r>
+              <a:rPr lang="fr-FR" sz="600" dirty="0" smtClean="0">
+                <a:latin typeface="Stone Serif" pitchFamily="2" charset="0"/>
+              </a:rPr>
+              <a:t>services. </a:t>
+            </a:r>
+            <a:r>
+              <a:rPr lang="fr-FR" sz="600" dirty="0" smtClean="0">
+                <a:latin typeface="Stone Serif" pitchFamily="2" charset="0"/>
+              </a:rPr>
+              <a:t>La plateforme est mise en place par une ou des organisations qui tirent parti de la valeur créée</a:t>
+            </a:r>
+            <a:r>
+              <a:rPr lang="fr-FR" sz="600" dirty="0" smtClean="0">
+                <a:latin typeface="Stone Serif" pitchFamily="2" charset="0"/>
+              </a:rPr>
+              <a:t>. Plus il y a d’utilisateurs de la plateforme, plus ils en tirent de valeur (effets réseaux).</a:t>
+            </a:r>
+            <a:endParaRPr lang="fr-FR" sz="600" dirty="0" smtClean="0">
               <a:latin typeface="Stone Serif" pitchFamily="2" charset="0"/>
             </a:endParaRPr>
           </a:p>
@@ -12399,25 +12462,64 @@
               </a:spcBef>
             </a:pPr>
             <a:r>
-              <a:rPr lang="fr-FR" sz="700" b="1" dirty="0" smtClean="0">
+              <a:rPr lang="fr-FR" sz="600" b="1" dirty="0" smtClean="0">
                 <a:latin typeface="Stone Serif" pitchFamily="2" charset="0"/>
               </a:rPr>
               <a:t>Les plateformes ressemblent aux organisations </a:t>
             </a:r>
             <a:r>
-              <a:rPr lang="fr-FR" sz="700" dirty="0" smtClean="0">
-                <a:latin typeface="Stone Serif" pitchFamily="2" charset="0"/>
-              </a:rPr>
-              <a:t>dans la mesure où ce sont le plus souvent des entreprises ou des instances publiques qui les créent. Mais au contraire des organisations, les ressources, l’activité et la valeur dégagée sont produits par des producteurs et consommateurs situés à l’extérieur de l’organisation.</a:t>
+              <a:rPr lang="fr-FR" sz="600" dirty="0" smtClean="0">
+                <a:latin typeface="Stone Serif" pitchFamily="2" charset="0"/>
+              </a:rPr>
+              <a:t>dans la mesure où ce sont le plus souvent des entreprises ou des instances publiques qui les créent. Mais au contraire des organisations, les ressources, l’activité et la valeur dégagée sont </a:t>
+            </a:r>
+            <a:r>
+              <a:rPr lang="fr-FR" sz="600" dirty="0" smtClean="0">
+                <a:latin typeface="Stone Serif" pitchFamily="2" charset="0"/>
+              </a:rPr>
+              <a:t>produites </a:t>
+            </a:r>
+            <a:r>
+              <a:rPr lang="fr-FR" sz="600" dirty="0" smtClean="0">
+                <a:latin typeface="Stone Serif" pitchFamily="2" charset="0"/>
+              </a:rPr>
+              <a:t>par des producteurs et consommateurs situés à l’extérieur de l’organisation.</a:t>
             </a:r>
             <a:br>
-              <a:rPr lang="fr-FR" sz="700" dirty="0" smtClean="0">
+              <a:rPr lang="fr-FR" sz="600" dirty="0" smtClean="0">
                 <a:latin typeface="Stone Serif" pitchFamily="2" charset="0"/>
               </a:rPr>
             </a:br>
-            <a:endParaRPr lang="fr-FR" sz="700" dirty="0" smtClean="0">
-              <a:latin typeface="Stone Serif" pitchFamily="2" charset="0"/>
-            </a:endParaRPr>
+            <a:r>
+              <a:rPr lang="fr-FR" sz="600" b="1" dirty="0" smtClean="0">
+                <a:latin typeface="Stone Serif" pitchFamily="2" charset="0"/>
+              </a:rPr>
+              <a:t>Les </a:t>
+            </a:r>
+            <a:r>
+              <a:rPr lang="fr-FR" sz="600" b="1" dirty="0" smtClean="0">
+                <a:latin typeface="Stone Serif" pitchFamily="2" charset="0"/>
+              </a:rPr>
+              <a:t>plateformes ressemblent aux marchés </a:t>
+            </a:r>
+            <a:r>
+              <a:rPr lang="fr-FR" sz="600" dirty="0" smtClean="0">
+                <a:latin typeface="Stone Serif" pitchFamily="2" charset="0"/>
+              </a:rPr>
+              <a:t>dans la mesure où la valeur est créée par des agents indépendants qui opèrent des transactions « atomiques » (échanges, services ou ventes </a:t>
+            </a:r>
+            <a:r>
+              <a:rPr lang="fr-FR" sz="600" u="sng" dirty="0" smtClean="0">
+                <a:latin typeface="Stone Serif" pitchFamily="2" charset="0"/>
+              </a:rPr>
+              <a:t>à la pièce</a:t>
+            </a:r>
+            <a:r>
+              <a:rPr lang="fr-FR" sz="600" dirty="0" smtClean="0">
+                <a:latin typeface="Stone Serif" pitchFamily="2" charset="0"/>
+              </a:rPr>
+              <a:t>). Mais au contraire des marchés, ces transactions sont organisées et contrôlées très fortement par une organisation – qui joue en quelque sorte le rôle de « place de marché privée ».</a:t>
+            </a:r>
           </a:p>
           <a:p>
             <a:pPr algn="just">
@@ -12428,41 +12530,7 @@
                 <a:spcPts val="0"/>
               </a:spcBef>
             </a:pPr>
-            <a:r>
-              <a:rPr lang="fr-FR" sz="700" b="1" dirty="0" smtClean="0">
-                <a:latin typeface="Stone Serif" pitchFamily="2" charset="0"/>
-              </a:rPr>
-              <a:t>Les plateformes ressemblent aux marchés </a:t>
-            </a:r>
-            <a:r>
-              <a:rPr lang="fr-FR" sz="700" dirty="0" smtClean="0">
-                <a:latin typeface="Stone Serif" pitchFamily="2" charset="0"/>
-              </a:rPr>
-              <a:t>dans la mesure où la valeur est créée par des agents indépendants qui opèrent des transactions « atomiques » (échanges, services ou ventes </a:t>
-            </a:r>
-            <a:r>
-              <a:rPr lang="fr-FR" sz="700" u="sng" dirty="0" smtClean="0">
-                <a:latin typeface="Stone Serif" pitchFamily="2" charset="0"/>
-              </a:rPr>
-              <a:t>à la pièce</a:t>
-            </a:r>
-            <a:r>
-              <a:rPr lang="fr-FR" sz="700" dirty="0" smtClean="0">
-                <a:latin typeface="Stone Serif" pitchFamily="2" charset="0"/>
-              </a:rPr>
-              <a:t>). Mais au contraire des marchés, ces transactions sont organisées et contrôlées très fortement par une organisation – qui joue en quelque sorte le rôle de « place de marché privée ».</a:t>
-            </a:r>
-          </a:p>
-          <a:p>
-            <a:pPr algn="just">
-              <a:lnSpc>
-                <a:spcPct val="135000"/>
-              </a:lnSpc>
-              <a:spcBef>
-                <a:spcPts val="0"/>
-              </a:spcBef>
-            </a:pPr>
-            <a:endParaRPr lang="fr-FR" sz="780" dirty="0" smtClean="0">
+            <a:endParaRPr lang="fr-FR" sz="600" dirty="0" smtClean="0">
               <a:latin typeface="Stone Serif" pitchFamily="2" charset="0"/>
             </a:endParaRPr>
           </a:p>
@@ -12477,7 +12545,7 @@
         <p:spPr>
           <a:xfrm>
             <a:off x="432658" y="957446"/>
-            <a:ext cx="3409240" cy="320857"/>
+            <a:ext cx="3114427" cy="320857"/>
           </a:xfrm>
           <a:prstGeom prst="rect">
             <a:avLst/>
@@ -12514,8 +12582,8 @@
         </p:nvSpPr>
         <p:spPr>
           <a:xfrm>
-            <a:off x="4083172" y="957446"/>
-            <a:ext cx="3246204" cy="549381"/>
+            <a:off x="3600450" y="957446"/>
+            <a:ext cx="3728926" cy="289695"/>
           </a:xfrm>
           <a:prstGeom prst="rect">
             <a:avLst/>
@@ -12536,24 +12604,24 @@
               </a:lnSpc>
             </a:pPr>
             <a:r>
-              <a:rPr lang="fr-FR" sz="1100" dirty="0" smtClean="0">
+              <a:rPr lang="fr-FR" sz="1050" dirty="0" smtClean="0">
                 <a:latin typeface="Stone Serif" pitchFamily="2" charset="0"/>
               </a:rPr>
               <a:t>La « data-</a:t>
             </a:r>
             <a:r>
-              <a:rPr lang="fr-FR" sz="1100" dirty="0" err="1" smtClean="0">
+              <a:rPr lang="fr-FR" sz="1050" dirty="0" err="1" smtClean="0">
                 <a:latin typeface="Stone Serif" pitchFamily="2" charset="0"/>
               </a:rPr>
               <a:t>ification</a:t>
             </a:r>
             <a:r>
-              <a:rPr lang="fr-FR" sz="1100" dirty="0" smtClean="0">
+              <a:rPr lang="fr-FR" sz="1050" dirty="0" smtClean="0">
                 <a:latin typeface="Stone Serif" pitchFamily="2" charset="0"/>
               </a:rPr>
               <a:t> », facteur clé de succès des plateformes</a:t>
             </a:r>
-            <a:endParaRPr lang="fr-FR" sz="1100" dirty="0">
+            <a:endParaRPr lang="fr-FR" sz="1050" dirty="0">
               <a:latin typeface="Stone Serif" pitchFamily="2" charset="0"/>
             </a:endParaRPr>
           </a:p>
@@ -12568,7 +12636,7 @@
           <p:nvPr/>
         </p:nvPicPr>
         <p:blipFill>
-          <a:blip r:embed="rId2" cstate="print">
+          <a:blip r:embed="rId3" cstate="print">
             <a:extLst>
               <a:ext uri="{28A0092B-C50C-407E-A947-70E740481C1C}">
                 <a14:useLocalDpi xmlns:a14="http://schemas.microsoft.com/office/drawing/2010/main" val="0"/>
@@ -12624,13 +12692,13 @@
             </a:r>
             <a:r>
               <a:rPr lang="fr-FR" sz="700" dirty="0">
-                <a:hlinkClick r:id="rId3"/>
+                <a:hlinkClick r:id="rId4"/>
               </a:rPr>
               <a:t>https://</a:t>
             </a:r>
             <a:r>
               <a:rPr lang="fr-FR" sz="900" dirty="0" smtClean="0">
-                <a:hlinkClick r:id="rId3"/>
+                <a:hlinkClick r:id="rId4"/>
               </a:rPr>
               <a:t>emlyon.github.io/mk99</a:t>
             </a:r>
@@ -13145,8 +13213,8 @@
         </p:nvSpPr>
         <p:spPr>
           <a:xfrm>
-            <a:off x="432366" y="3795987"/>
-            <a:ext cx="4515318" cy="279307"/>
+            <a:off x="432366" y="3291059"/>
+            <a:ext cx="3085534" cy="279307"/>
           </a:xfrm>
           <a:prstGeom prst="rect">
             <a:avLst/>
@@ -13188,8 +13256,8 @@
         </p:nvSpPr>
         <p:spPr>
           <a:xfrm>
-            <a:off x="5019992" y="4007791"/>
-            <a:ext cx="2295208" cy="372529"/>
+            <a:off x="3600449" y="3430712"/>
+            <a:ext cx="3714749" cy="908553"/>
           </a:xfrm>
           <a:prstGeom prst="rect">
             <a:avLst/>
@@ -13202,7 +13270,7 @@
           </a:ln>
         </p:spPr>
         <p:txBody>
-          <a:bodyPr vert="horz" lIns="91440" tIns="45720" rIns="91440" bIns="45720" rtlCol="0">
+          <a:bodyPr vert="horz" lIns="91440" tIns="45720" rIns="91440" bIns="45720" numCol="3" rtlCol="0">
             <a:noAutofit/>
           </a:bodyPr>
           <a:lstStyle>
@@ -13376,48 +13444,102 @@
               </a:lnSpc>
             </a:pPr>
             <a:r>
-              <a:rPr lang="fr-FR" sz="800" dirty="0" smtClean="0">
-                <a:latin typeface="Stone Serif" pitchFamily="2" charset="0"/>
-              </a:rPr>
-              <a:t>Platform Design </a:t>
-            </a:r>
-            <a:r>
-              <a:rPr lang="fr-FR" sz="800" dirty="0" err="1" smtClean="0">
-                <a:latin typeface="Stone Serif" pitchFamily="2" charset="0"/>
-              </a:rPr>
-              <a:t>Toolkit</a:t>
-            </a:r>
-            <a:r>
-              <a:rPr lang="fr-FR" sz="800" dirty="0">
-                <a:latin typeface="Stone Serif" pitchFamily="2" charset="0"/>
-              </a:rPr>
-              <a:t>:</a:t>
-            </a:r>
-            <a:br>
-              <a:rPr lang="fr-FR" sz="800" dirty="0">
-                <a:latin typeface="Stone Serif" pitchFamily="2" charset="0"/>
-              </a:rPr>
-            </a:br>
-            <a:r>
-              <a:rPr lang="fr-FR" sz="800" dirty="0">
-                <a:latin typeface="Stone Serif" pitchFamily="2" charset="0"/>
-                <a:hlinkClick r:id="rId4"/>
-              </a:rPr>
-              <a:t>https://platformdesigntoolkit.com</a:t>
-            </a:r>
-            <a:r>
-              <a:rPr lang="fr-FR" sz="800" dirty="0" smtClean="0">
-                <a:latin typeface="Stone Serif" pitchFamily="2" charset="0"/>
-                <a:hlinkClick r:id="rId4"/>
-              </a:rPr>
-              <a:t>/</a:t>
-            </a:r>
-            <a:r>
-              <a:rPr lang="fr-FR" sz="800" dirty="0" smtClean="0">
-                <a:latin typeface="Stone Serif" pitchFamily="2" charset="0"/>
-              </a:rPr>
-              <a:t> </a:t>
-            </a:r>
+              <a:rPr lang="fr-FR" sz="700" dirty="0" smtClean="0">
+                <a:latin typeface="Stone Serif" pitchFamily="2" charset="0"/>
+              </a:rPr>
+              <a:t>- Mettre en place un mécanisme de </a:t>
+            </a:r>
+            <a:r>
+              <a:rPr lang="fr-FR" sz="700" dirty="0" err="1" smtClean="0">
+                <a:latin typeface="Stone Serif" pitchFamily="2" charset="0"/>
+              </a:rPr>
+              <a:t>pricing</a:t>
+            </a:r>
+            <a:r>
+              <a:rPr lang="fr-FR" sz="700" dirty="0" smtClean="0">
+                <a:latin typeface="Stone Serif" pitchFamily="2" charset="0"/>
+              </a:rPr>
+              <a:t> avantageux pour toutes les parties (</a:t>
+            </a:r>
+            <a:r>
+              <a:rPr lang="fr-FR" sz="700" i="1" dirty="0" smtClean="0">
+                <a:latin typeface="Stone Serif" pitchFamily="2" charset="0"/>
+              </a:rPr>
+              <a:t>revenue management</a:t>
+            </a:r>
+            <a:r>
+              <a:rPr lang="fr-FR" sz="700" dirty="0" smtClean="0">
+                <a:latin typeface="Stone Serif" pitchFamily="2" charset="0"/>
+              </a:rPr>
+              <a:t>)</a:t>
+            </a:r>
+          </a:p>
+          <a:p>
+            <a:pPr algn="l">
+              <a:lnSpc>
+                <a:spcPct val="135000"/>
+              </a:lnSpc>
+            </a:pPr>
+            <a:r>
+              <a:rPr lang="fr-FR" sz="700" dirty="0" smtClean="0">
+                <a:latin typeface="Stone Serif" pitchFamily="2" charset="0"/>
+              </a:rPr>
+              <a:t>- Développer la </a:t>
+            </a:r>
+            <a:r>
+              <a:rPr lang="fr-FR" sz="700" dirty="0">
+                <a:latin typeface="Stone Serif" pitchFamily="2" charset="0"/>
+              </a:rPr>
+              <a:t>confiance entre les parties </a:t>
+            </a:r>
+            <a:r>
+              <a:rPr lang="fr-FR" sz="700" dirty="0" smtClean="0">
+                <a:latin typeface="Stone Serif" pitchFamily="2" charset="0"/>
+              </a:rPr>
+              <a:t>avec des </a:t>
+            </a:r>
+            <a:r>
+              <a:rPr lang="fr-FR" sz="700" dirty="0">
+                <a:latin typeface="Stone Serif" pitchFamily="2" charset="0"/>
+              </a:rPr>
+              <a:t>mécanismes de réputation (évaluations entre </a:t>
+            </a:r>
+            <a:r>
+              <a:rPr lang="fr-FR" sz="700" dirty="0" smtClean="0">
+                <a:latin typeface="Stone Serif" pitchFamily="2" charset="0"/>
+              </a:rPr>
+              <a:t>utilisateurs)</a:t>
+            </a:r>
+          </a:p>
+          <a:p>
+            <a:pPr marL="171450" indent="-171450" algn="l">
+              <a:lnSpc>
+                <a:spcPct val="135000"/>
+              </a:lnSpc>
+              <a:buFontTx/>
+              <a:buChar char="-"/>
+            </a:pPr>
+            <a:r>
+              <a:rPr lang="fr-FR" sz="700" dirty="0" smtClean="0">
+                <a:latin typeface="Stone Serif" pitchFamily="2" charset="0"/>
+              </a:rPr>
+              <a:t>Faciliter </a:t>
+            </a:r>
+            <a:r>
+              <a:rPr lang="fr-FR" sz="700" dirty="0">
+                <a:latin typeface="Stone Serif" pitchFamily="2" charset="0"/>
+              </a:rPr>
+              <a:t>l'ajout d'applications gratuites sur votre plate-forme, car cela augmente la valeur pour toutes les </a:t>
+            </a:r>
+            <a:r>
+              <a:rPr lang="fr-FR" sz="700" dirty="0" smtClean="0">
+                <a:latin typeface="Stone Serif" pitchFamily="2" charset="0"/>
+              </a:rPr>
+              <a:t>parties.</a:t>
+            </a:r>
+            <a:endParaRPr lang="fr-FR" sz="700" dirty="0" smtClean="0">
+              <a:latin typeface="Stone Serif" pitchFamily="2" charset="0"/>
+            </a:endParaRPr>
           </a:p>
         </p:txBody>
       </p:sp>
@@ -13429,7 +13551,7 @@
         </p:nvSpPr>
         <p:spPr>
           <a:xfrm>
-            <a:off x="5019992" y="3784720"/>
+            <a:off x="3600450" y="3165907"/>
             <a:ext cx="2295207" cy="279307"/>
           </a:xfrm>
           <a:prstGeom prst="rect">
@@ -13454,7 +13576,7 @@
               <a:rPr lang="fr-FR" sz="900" dirty="0" smtClean="0">
                 <a:latin typeface="Stone Serif" pitchFamily="2" charset="0"/>
               </a:rPr>
-              <a:t>Pour vous guider</a:t>
+              <a:t>Points de vigilance</a:t>
             </a:r>
             <a:endParaRPr lang="fr-FR" sz="900" dirty="0">
               <a:latin typeface="Stone Serif" pitchFamily="2" charset="0"/>

</xml_diff>

<commit_message>
added conf appel à contrib
</commit_message>
<xml_diff>
--- a/docs/content/fr/cards.pptx
+++ b/docs/content/fr/cards.pptx
@@ -211,7 +211,7 @@
           <a:p>
             <a:fld id="{D121557B-95DC-4F9D-80D7-494E711A263C}" type="datetimeFigureOut">
               <a:rPr lang="fr-FR" smtClean="0"/>
-              <a:t>18/06/2019</a:t>
+              <a:t>23/06/2019</a:t>
             </a:fld>
             <a:endParaRPr lang="fr-FR"/>
           </a:p>
@@ -377,7 +377,7 @@
           <a:p>
             <a:fld id="{34B0D5AD-2B20-4FC5-9805-AA792A2BEE79}" type="datetimeFigureOut">
               <a:rPr lang="fr-FR" smtClean="0"/>
-              <a:t>18/06/2019</a:t>
+              <a:t>23/06/2019</a:t>
             </a:fld>
             <a:endParaRPr lang="fr-FR"/>
           </a:p>
@@ -838,7 +838,7 @@
           <a:p>
             <a:fld id="{654FF092-CFE9-4329-97B3-D872B1066925}" type="datetimeFigureOut">
               <a:rPr lang="fr-FR" smtClean="0"/>
-              <a:t>18/06/2019</a:t>
+              <a:t>23/06/2019</a:t>
             </a:fld>
             <a:endParaRPr lang="fr-FR"/>
           </a:p>
@@ -1008,7 +1008,7 @@
           <a:p>
             <a:fld id="{654FF092-CFE9-4329-97B3-D872B1066925}" type="datetimeFigureOut">
               <a:rPr lang="fr-FR" smtClean="0"/>
-              <a:t>18/06/2019</a:t>
+              <a:t>23/06/2019</a:t>
             </a:fld>
             <a:endParaRPr lang="fr-FR"/>
           </a:p>
@@ -1188,7 +1188,7 @@
           <a:p>
             <a:fld id="{654FF092-CFE9-4329-97B3-D872B1066925}" type="datetimeFigureOut">
               <a:rPr lang="fr-FR" smtClean="0"/>
-              <a:t>18/06/2019</a:t>
+              <a:t>23/06/2019</a:t>
             </a:fld>
             <a:endParaRPr lang="fr-FR"/>
           </a:p>
@@ -1358,7 +1358,7 @@
           <a:p>
             <a:fld id="{654FF092-CFE9-4329-97B3-D872B1066925}" type="datetimeFigureOut">
               <a:rPr lang="fr-FR" smtClean="0"/>
-              <a:t>18/06/2019</a:t>
+              <a:t>23/06/2019</a:t>
             </a:fld>
             <a:endParaRPr lang="fr-FR"/>
           </a:p>
@@ -1602,7 +1602,7 @@
           <a:p>
             <a:fld id="{654FF092-CFE9-4329-97B3-D872B1066925}" type="datetimeFigureOut">
               <a:rPr lang="fr-FR" smtClean="0"/>
-              <a:t>18/06/2019</a:t>
+              <a:t>23/06/2019</a:t>
             </a:fld>
             <a:endParaRPr lang="fr-FR"/>
           </a:p>
@@ -1834,7 +1834,7 @@
           <a:p>
             <a:fld id="{654FF092-CFE9-4329-97B3-D872B1066925}" type="datetimeFigureOut">
               <a:rPr lang="fr-FR" smtClean="0"/>
-              <a:t>18/06/2019</a:t>
+              <a:t>23/06/2019</a:t>
             </a:fld>
             <a:endParaRPr lang="fr-FR"/>
           </a:p>
@@ -2201,7 +2201,7 @@
           <a:p>
             <a:fld id="{654FF092-CFE9-4329-97B3-D872B1066925}" type="datetimeFigureOut">
               <a:rPr lang="fr-FR" smtClean="0"/>
-              <a:t>18/06/2019</a:t>
+              <a:t>23/06/2019</a:t>
             </a:fld>
             <a:endParaRPr lang="fr-FR"/>
           </a:p>
@@ -2319,7 +2319,7 @@
           <a:p>
             <a:fld id="{654FF092-CFE9-4329-97B3-D872B1066925}" type="datetimeFigureOut">
               <a:rPr lang="fr-FR" smtClean="0"/>
-              <a:t>18/06/2019</a:t>
+              <a:t>23/06/2019</a:t>
             </a:fld>
             <a:endParaRPr lang="fr-FR"/>
           </a:p>
@@ -2414,7 +2414,7 @@
           <a:p>
             <a:fld id="{654FF092-CFE9-4329-97B3-D872B1066925}" type="datetimeFigureOut">
               <a:rPr lang="fr-FR" smtClean="0"/>
-              <a:t>18/06/2019</a:t>
+              <a:t>23/06/2019</a:t>
             </a:fld>
             <a:endParaRPr lang="fr-FR"/>
           </a:p>
@@ -2691,7 +2691,7 @@
           <a:p>
             <a:fld id="{654FF092-CFE9-4329-97B3-D872B1066925}" type="datetimeFigureOut">
               <a:rPr lang="fr-FR" smtClean="0"/>
-              <a:t>18/06/2019</a:t>
+              <a:t>23/06/2019</a:t>
             </a:fld>
             <a:endParaRPr lang="fr-FR"/>
           </a:p>
@@ -2948,7 +2948,7 @@
           <a:p>
             <a:fld id="{654FF092-CFE9-4329-97B3-D872B1066925}" type="datetimeFigureOut">
               <a:rPr lang="fr-FR" smtClean="0"/>
-              <a:t>18/06/2019</a:t>
+              <a:t>23/06/2019</a:t>
             </a:fld>
             <a:endParaRPr lang="fr-FR"/>
           </a:p>
@@ -3161,7 +3161,7 @@
           <a:p>
             <a:fld id="{654FF092-CFE9-4329-97B3-D872B1066925}" type="datetimeFigureOut">
               <a:rPr lang="fr-FR" smtClean="0"/>
-              <a:t>18/06/2019</a:t>
+              <a:t>23/06/2019</a:t>
             </a:fld>
             <a:endParaRPr lang="fr-FR"/>
           </a:p>
@@ -11026,13 +11026,7 @@
               <a:rPr lang="fr-FR" sz="700" dirty="0" smtClean="0">
                 <a:latin typeface="Stone Serif" pitchFamily="2" charset="0"/>
               </a:rPr>
-              <a:t>, Odile Jacob, 2018</a:t>
-            </a:r>
-            <a:r>
-              <a:rPr lang="fr-FR" sz="700" dirty="0" smtClean="0">
-                <a:latin typeface="Stone Serif" pitchFamily="2" charset="0"/>
-              </a:rPr>
-              <a:t>.</a:t>
+              <a:t>, Odile Jacob, 2018.</a:t>
             </a:r>
           </a:p>
           <a:p>
@@ -12416,74 +12410,29 @@
               <a:rPr lang="fr-FR" sz="600" dirty="0" smtClean="0">
                 <a:latin typeface="Stone Serif" pitchFamily="2" charset="0"/>
               </a:rPr>
-              <a:t>, qui coordonne et stimule les transactions </a:t>
+              <a:t>, qui coordonne et stimule les transactions entre producteurs et consommateurs de biens et services. La plateforme est mise en place par une ou des organisations qui tirent parti de la valeur créée. Plus il y a d’utilisateurs de la plateforme, plus ils en tirent de valeur (effets réseaux).</a:t>
+            </a:r>
+          </a:p>
+          <a:p>
+            <a:pPr algn="l">
+              <a:lnSpc>
+                <a:spcPct val="135000"/>
+              </a:lnSpc>
+              <a:spcBef>
+                <a:spcPts val="0"/>
+              </a:spcBef>
+            </a:pPr>
+            <a:r>
+              <a:rPr lang="fr-FR" sz="600" b="1" dirty="0" smtClean="0">
+                <a:latin typeface="Stone Serif" pitchFamily="2" charset="0"/>
+              </a:rPr>
+              <a:t>Les plateformes ressemblent aux organisations </a:t>
             </a:r>
             <a:r>
               <a:rPr lang="fr-FR" sz="600" dirty="0" smtClean="0">
                 <a:latin typeface="Stone Serif" pitchFamily="2" charset="0"/>
               </a:rPr>
-              <a:t>entre producteurs </a:t>
-            </a:r>
-            <a:r>
-              <a:rPr lang="fr-FR" sz="600" dirty="0" smtClean="0">
-                <a:latin typeface="Stone Serif" pitchFamily="2" charset="0"/>
-              </a:rPr>
-              <a:t>et consommateurs de biens et </a:t>
-            </a:r>
-            <a:r>
-              <a:rPr lang="fr-FR" sz="600" dirty="0" smtClean="0">
-                <a:latin typeface="Stone Serif" pitchFamily="2" charset="0"/>
-              </a:rPr>
-              <a:t>services. </a:t>
-            </a:r>
-            <a:r>
-              <a:rPr lang="fr-FR" sz="600" dirty="0" smtClean="0">
-                <a:latin typeface="Stone Serif" pitchFamily="2" charset="0"/>
-              </a:rPr>
-              <a:t>La plateforme est mise en place par une ou des organisations qui tirent parti de la valeur créée</a:t>
-            </a:r>
-            <a:r>
-              <a:rPr lang="fr-FR" sz="600" dirty="0" smtClean="0">
-                <a:latin typeface="Stone Serif" pitchFamily="2" charset="0"/>
-              </a:rPr>
-              <a:t>. Plus il y a d’utilisateurs de la plateforme, plus ils en tirent de valeur (effets réseaux).</a:t>
-            </a:r>
-            <a:endParaRPr lang="fr-FR" sz="600" dirty="0" smtClean="0">
-              <a:latin typeface="Stone Serif" pitchFamily="2" charset="0"/>
-            </a:endParaRPr>
-          </a:p>
-          <a:p>
-            <a:pPr algn="l">
-              <a:lnSpc>
-                <a:spcPct val="135000"/>
-              </a:lnSpc>
-              <a:spcBef>
-                <a:spcPts val="0"/>
-              </a:spcBef>
-            </a:pPr>
-            <a:r>
-              <a:rPr lang="fr-FR" sz="600" b="1" dirty="0" smtClean="0">
-                <a:latin typeface="Stone Serif" pitchFamily="2" charset="0"/>
-              </a:rPr>
-              <a:t>Les plateformes ressemblent aux organisations </a:t>
-            </a:r>
-            <a:r>
-              <a:rPr lang="fr-FR" sz="600" dirty="0" smtClean="0">
-                <a:latin typeface="Stone Serif" pitchFamily="2" charset="0"/>
-              </a:rPr>
-              <a:t>dans la mesure où ce sont le plus souvent des entreprises ou des instances publiques qui les créent. Mais au contraire des organisations, les ressources, l’activité et la valeur dégagée sont </a:t>
-            </a:r>
-            <a:r>
-              <a:rPr lang="fr-FR" sz="600" dirty="0" smtClean="0">
-                <a:latin typeface="Stone Serif" pitchFamily="2" charset="0"/>
-              </a:rPr>
-              <a:t>produites </a:t>
-            </a:r>
-            <a:r>
-              <a:rPr lang="fr-FR" sz="600" dirty="0" smtClean="0">
-                <a:latin typeface="Stone Serif" pitchFamily="2" charset="0"/>
-              </a:rPr>
-              <a:t>par des producteurs et consommateurs situés à l’extérieur de l’organisation.</a:t>
+              <a:t>dans la mesure où ce sont le plus souvent des entreprises ou des instances publiques qui les créent. Mais au contraire des organisations, les ressources, l’activité et la valeur dégagée sont produites par des producteurs et consommateurs situés à l’extérieur de l’organisation.</a:t>
             </a:r>
             <a:br>
               <a:rPr lang="fr-FR" sz="600" dirty="0" smtClean="0">
@@ -12494,13 +12443,7 @@
               <a:rPr lang="fr-FR" sz="600" b="1" dirty="0" smtClean="0">
                 <a:latin typeface="Stone Serif" pitchFamily="2" charset="0"/>
               </a:rPr>
-              <a:t>Les </a:t>
-            </a:r>
-            <a:r>
-              <a:rPr lang="fr-FR" sz="600" b="1" dirty="0" smtClean="0">
-                <a:latin typeface="Stone Serif" pitchFamily="2" charset="0"/>
-              </a:rPr>
-              <a:t>plateformes ressemblent aux marchés </a:t>
+              <a:t>Les plateformes ressemblent aux marchés </a:t>
             </a:r>
             <a:r>
               <a:rPr lang="fr-FR" sz="600" dirty="0" smtClean="0">
@@ -13512,18 +13455,16 @@
             </a:r>
           </a:p>
           <a:p>
-            <a:pPr marL="171450" indent="-171450" algn="l">
+            <a:pPr algn="l">
               <a:lnSpc>
                 <a:spcPct val="135000"/>
               </a:lnSpc>
-              <a:buFontTx/>
-              <a:buChar char="-"/>
             </a:pPr>
             <a:r>
               <a:rPr lang="fr-FR" sz="700" dirty="0" smtClean="0">
                 <a:latin typeface="Stone Serif" pitchFamily="2" charset="0"/>
               </a:rPr>
-              <a:t>Faciliter </a:t>
+              <a:t>- Faciliter </a:t>
             </a:r>
             <a:r>
               <a:rPr lang="fr-FR" sz="700" dirty="0">
@@ -13537,9 +13478,6 @@
               </a:rPr>
               <a:t>parties.</a:t>
             </a:r>
-            <a:endParaRPr lang="fr-FR" sz="700" dirty="0" smtClean="0">
-              <a:latin typeface="Stone Serif" pitchFamily="2" charset="0"/>
-            </a:endParaRPr>
           </a:p>
         </p:txBody>
       </p:sp>
@@ -23911,7 +23849,19 @@
               <a:rPr lang="fr-FR" sz="700" dirty="0" smtClean="0">
                 <a:latin typeface="Stone Serif" pitchFamily="2" charset="0"/>
               </a:rPr>
-              <a:t>  facturé à l’usage, sans achat de la ressource sous-jacente au service (serveur, logiciel). Depuis l’essor du cloud en 2006, les services disponibles en mode cloud se sont diversifiés : depuis la simple location de puissance de calcul (« Infrastructure as a service ») jusqu’à l’accès une application métier complète (« Software as a service »).</a:t>
+              <a:t>  facturé à l’usage, sans achat de la ressource sous-jacente au service (serveur, logiciel). Depuis l’essor du cloud en 2006, les services disponibles en mode cloud se sont diversifiés : depuis la simple location de puissance de calcul (« Infrastructure as a service ») jusqu’à l’accès </a:t>
+            </a:r>
+            <a:r>
+              <a:rPr lang="fr-FR" sz="700" dirty="0" smtClean="0">
+                <a:latin typeface="Stone Serif" pitchFamily="2" charset="0"/>
+              </a:rPr>
+              <a:t>à une </a:t>
+            </a:r>
+            <a:r>
+              <a:rPr lang="fr-FR" sz="700" dirty="0" smtClean="0">
+                <a:latin typeface="Stone Serif" pitchFamily="2" charset="0"/>
+              </a:rPr>
+              <a:t>application métier complète (« Software as a service »).</a:t>
             </a:r>
           </a:p>
         </p:txBody>
@@ -34045,10 +33995,16 @@
               <a:t>Underwood</a:t>
             </a:r>
             <a:r>
+              <a:rPr lang="fr-FR" sz="800" dirty="0">
+                <a:latin typeface="Stone Serif" pitchFamily="2" charset="0"/>
+              </a:rPr>
+              <a:t>,</a:t>
+            </a:r>
+            <a:r>
               <a:rPr lang="fr-FR" sz="800" dirty="0" smtClean="0">
                 <a:latin typeface="Stone Serif" pitchFamily="2" charset="0"/>
               </a:rPr>
-              <a:t>. Seth Grimes.</a:t>
+              <a:t> Seth Grimes.</a:t>
             </a:r>
             <a:endParaRPr lang="fr-FR" sz="800" dirty="0">
               <a:latin typeface="Stone Serif" pitchFamily="2" charset="0"/>

</xml_diff>